<commit_message>
Edit presentation, add speech
</commit_message>
<xml_diff>
--- a/presentation.pptx
+++ b/presentation.pptx
@@ -9191,7 +9191,7 @@
               <a:latin typeface="Times New Roman" panose="02020603050405020304" pitchFamily="18" charset="0"/>
               <a:cs typeface="Times New Roman" panose="02020603050405020304" pitchFamily="18" charset="0"/>
             </a:rPr>
-            <a:t>Server layer</a:t>
+            <a:t>Database layer</a:t>
           </a:r>
         </a:p>
       </dgm:t>
@@ -13562,7 +13562,7 @@
               <a:latin typeface="Times New Roman" panose="02020603050405020304" pitchFamily="18" charset="0"/>
               <a:cs typeface="Times New Roman" panose="02020603050405020304" pitchFamily="18" charset="0"/>
             </a:rPr>
-            <a:t>Server layer</a:t>
+            <a:t>Database layer</a:t>
           </a:r>
         </a:p>
       </dsp:txBody>
@@ -25355,7 +25355,7 @@
           <a:effectLst/>
           <a:extLst>
             <a:ext uri="{91240B29-F687-4f45-9708-019B960494DF}">
-              <a14:hiddenLine xmlns:a14="http://schemas.microsoft.com/office/drawing/2010/main" xmlns="" w="9525">
+              <a14:hiddenLine xmlns="" xmlns:a14="http://schemas.microsoft.com/office/drawing/2010/main" w="9525">
                 <a:solidFill>
                   <a:srgbClr val="000000"/>
                 </a:solidFill>
@@ -25547,7 +25547,7 @@
           <a:p>
             <a:fld id="{E133CC28-1BF0-4371-9E36-1469D628F18D}" type="datetimeFigureOut">
               <a:rPr lang="en-US" smtClean="0"/>
-              <a:t>10/15/2022</a:t>
+              <a:t>10/16/2022</a:t>
             </a:fld>
             <a:endParaRPr lang="en-US"/>
           </a:p>
@@ -25865,7 +25865,7 @@
           <a:p>
             <a:fld id="{E133CC28-1BF0-4371-9E36-1469D628F18D}" type="datetimeFigureOut">
               <a:rPr lang="en-US" smtClean="0"/>
-              <a:t>10/15/2022</a:t>
+              <a:t>10/16/2022</a:t>
             </a:fld>
             <a:endParaRPr lang="en-US"/>
           </a:p>
@@ -26353,7 +26353,7 @@
           <a:p>
             <a:fld id="{E133CC28-1BF0-4371-9E36-1469D628F18D}" type="datetimeFigureOut">
               <a:rPr lang="en-US" smtClean="0"/>
-              <a:t>10/15/2022</a:t>
+              <a:t>10/16/2022</a:t>
             </a:fld>
             <a:endParaRPr lang="en-US"/>
           </a:p>
@@ -26722,7 +26722,7 @@
           <a:p>
             <a:fld id="{E133CC28-1BF0-4371-9E36-1469D628F18D}" type="datetimeFigureOut">
               <a:rPr lang="en-US" smtClean="0"/>
-              <a:t>10/15/2022</a:t>
+              <a:t>10/16/2022</a:t>
             </a:fld>
             <a:endParaRPr lang="en-US"/>
           </a:p>
@@ -26877,7 +26877,7 @@
           <a:ln/>
           <a:extLst>
             <a:ext uri="{91240B29-F687-4f45-9708-019B960494DF}">
-              <a14:hiddenLine xmlns:a14="http://schemas.microsoft.com/office/drawing/2010/main" xmlns="" w="9525">
+              <a14:hiddenLine xmlns="" xmlns:a14="http://schemas.microsoft.com/office/drawing/2010/main" w="9525">
                 <a:solidFill>
                   <a:srgbClr val="000000"/>
                 </a:solidFill>
@@ -26995,7 +26995,7 @@
           <a:p>
             <a:fld id="{E133CC28-1BF0-4371-9E36-1469D628F18D}" type="datetimeFigureOut">
               <a:rPr lang="en-US" smtClean="0"/>
-              <a:t>10/15/2022</a:t>
+              <a:t>10/16/2022</a:t>
             </a:fld>
             <a:endParaRPr lang="en-US"/>
           </a:p>
@@ -27152,7 +27152,7 @@
           <a:ln/>
           <a:extLst>
             <a:ext uri="{91240B29-F687-4f45-9708-019B960494DF}">
-              <a14:hiddenLine xmlns:a14="http://schemas.microsoft.com/office/drawing/2010/main" xmlns="" w="9525">
+              <a14:hiddenLine xmlns="" xmlns:a14="http://schemas.microsoft.com/office/drawing/2010/main" w="9525">
                 <a:solidFill>
                   <a:srgbClr val="000000"/>
                 </a:solidFill>
@@ -27280,7 +27280,7 @@
           <a:p>
             <a:fld id="{E133CC28-1BF0-4371-9E36-1469D628F18D}" type="datetimeFigureOut">
               <a:rPr lang="en-US" smtClean="0"/>
-              <a:t>10/15/2022</a:t>
+              <a:t>10/16/2022</a:t>
             </a:fld>
             <a:endParaRPr lang="en-US"/>
           </a:p>
@@ -27435,7 +27435,7 @@
           <a:ln/>
           <a:extLst>
             <a:ext uri="{91240B29-F687-4f45-9708-019B960494DF}">
-              <a14:hiddenLine xmlns:a14="http://schemas.microsoft.com/office/drawing/2010/main" xmlns="" w="9525">
+              <a14:hiddenLine xmlns="" xmlns:a14="http://schemas.microsoft.com/office/drawing/2010/main" w="9525">
                 <a:solidFill>
                   <a:srgbClr val="000000"/>
                 </a:solidFill>
@@ -27563,7 +27563,7 @@
           <a:p>
             <a:fld id="{E133CC28-1BF0-4371-9E36-1469D628F18D}" type="datetimeFigureOut">
               <a:rPr lang="en-US" smtClean="0"/>
-              <a:t>10/15/2022</a:t>
+              <a:t>10/16/2022</a:t>
             </a:fld>
             <a:endParaRPr lang="en-US"/>
           </a:p>
@@ -27906,7 +27906,7 @@
           <a:p>
             <a:fld id="{E133CC28-1BF0-4371-9E36-1469D628F18D}" type="datetimeFigureOut">
               <a:rPr lang="en-US" smtClean="0"/>
-              <a:t>10/15/2022</a:t>
+              <a:t>10/16/2022</a:t>
             </a:fld>
             <a:endParaRPr lang="en-US"/>
           </a:p>
@@ -28061,7 +28061,7 @@
           <a:ln/>
           <a:extLst>
             <a:ext uri="{91240B29-F687-4f45-9708-019B960494DF}">
-              <a14:hiddenLine xmlns:a14="http://schemas.microsoft.com/office/drawing/2010/main" xmlns="" w="9525">
+              <a14:hiddenLine xmlns="" xmlns:a14="http://schemas.microsoft.com/office/drawing/2010/main" w="9525">
                 <a:solidFill>
                   <a:srgbClr val="000000"/>
                 </a:solidFill>
@@ -28245,7 +28245,7 @@
           <a:p>
             <a:fld id="{E133CC28-1BF0-4371-9E36-1469D628F18D}" type="datetimeFigureOut">
               <a:rPr lang="en-US" smtClean="0"/>
-              <a:t>10/15/2022</a:t>
+              <a:t>10/16/2022</a:t>
             </a:fld>
             <a:endParaRPr lang="en-US"/>
           </a:p>
@@ -28400,7 +28400,7 @@
           <a:ln/>
           <a:extLst>
             <a:ext uri="{91240B29-F687-4f45-9708-019B960494DF}">
-              <a14:hiddenLine xmlns:a14="http://schemas.microsoft.com/office/drawing/2010/main" xmlns="" w="9525">
+              <a14:hiddenLine xmlns="" xmlns:a14="http://schemas.microsoft.com/office/drawing/2010/main" w="9525">
                 <a:solidFill>
                   <a:srgbClr val="000000"/>
                 </a:solidFill>
@@ -28722,7 +28722,7 @@
           <a:p>
             <a:fld id="{E133CC28-1BF0-4371-9E36-1469D628F18D}" type="datetimeFigureOut">
               <a:rPr lang="en-US" smtClean="0"/>
-              <a:t>10/15/2022</a:t>
+              <a:t>10/16/2022</a:t>
             </a:fld>
             <a:endParaRPr lang="en-US"/>
           </a:p>
@@ -28877,7 +28877,7 @@
           <a:ln/>
           <a:extLst>
             <a:ext uri="{91240B29-F687-4f45-9708-019B960494DF}">
-              <a14:hiddenLine xmlns:a14="http://schemas.microsoft.com/office/drawing/2010/main" xmlns="" w="9525">
+              <a14:hiddenLine xmlns="" xmlns:a14="http://schemas.microsoft.com/office/drawing/2010/main" w="9525">
                 <a:solidFill>
                   <a:srgbClr val="000000"/>
                 </a:solidFill>
@@ -28943,7 +28943,7 @@
           <a:p>
             <a:fld id="{E133CC28-1BF0-4371-9E36-1469D628F18D}" type="datetimeFigureOut">
               <a:rPr lang="en-US" smtClean="0"/>
-              <a:t>10/15/2022</a:t>
+              <a:t>10/16/2022</a:t>
             </a:fld>
             <a:endParaRPr lang="en-US"/>
           </a:p>
@@ -29038,7 +29038,7 @@
           <a:p>
             <a:fld id="{E133CC28-1BF0-4371-9E36-1469D628F18D}" type="datetimeFigureOut">
               <a:rPr lang="en-US" smtClean="0"/>
-              <a:t>10/15/2022</a:t>
+              <a:t>10/16/2022</a:t>
             </a:fld>
             <a:endParaRPr lang="en-US"/>
           </a:p>
@@ -29306,7 +29306,7 @@
           <a:ln/>
           <a:extLst>
             <a:ext uri="{91240B29-F687-4f45-9708-019B960494DF}">
-              <a14:hiddenLine xmlns:a14="http://schemas.microsoft.com/office/drawing/2010/main" xmlns="" w="9525">
+              <a14:hiddenLine xmlns="" xmlns:a14="http://schemas.microsoft.com/office/drawing/2010/main" w="9525">
                 <a:solidFill>
                   <a:srgbClr val="000000"/>
                 </a:solidFill>
@@ -29505,7 +29505,7 @@
           <a:p>
             <a:fld id="{E133CC28-1BF0-4371-9E36-1469D628F18D}" type="datetimeFigureOut">
               <a:rPr lang="en-US" smtClean="0"/>
-              <a:t>10/15/2022</a:t>
+              <a:t>10/16/2022</a:t>
             </a:fld>
             <a:endParaRPr lang="en-US"/>
           </a:p>
@@ -29818,7 +29818,7 @@
           <a:p>
             <a:fld id="{E133CC28-1BF0-4371-9E36-1469D628F18D}" type="datetimeFigureOut">
               <a:rPr lang="en-US" smtClean="0"/>
-              <a:t>10/15/2022</a:t>
+              <a:t>10/16/2022</a:t>
             </a:fld>
             <a:endParaRPr lang="en-US"/>
           </a:p>
@@ -30088,7 +30088,7 @@
           <a:p>
             <a:fld id="{E133CC28-1BF0-4371-9E36-1469D628F18D}" type="datetimeFigureOut">
               <a:rPr lang="en-US" smtClean="0"/>
-              <a:t>10/15/2022</a:t>
+              <a:t>10/16/2022</a:t>
             </a:fld>
             <a:endParaRPr lang="en-US"/>
           </a:p>
@@ -32118,7 +32118,7 @@
           <a:effectLst/>
           <a:extLst>
             <a:ext uri="{91240B29-F687-4f45-9708-019B960494DF}">
-              <a14:hiddenLine xmlns="" xmlns:a14="http://schemas.microsoft.com/office/drawing/2010/main" xmlns:a16="http://schemas.microsoft.com/office/drawing/2014/main" w="9525">
+              <a14:hiddenLine xmlns:a16="http://schemas.microsoft.com/office/drawing/2014/main" xmlns:a14="http://schemas.microsoft.com/office/drawing/2010/main" xmlns="" w="9525">
                 <a:solidFill>
                   <a:srgbClr val="000000"/>
                 </a:solidFill>
@@ -33140,7 +33140,7 @@
           </a:ln>
           <a:extLst>
             <a:ext uri="{91240B29-F687-4f45-9708-019B960494DF}">
-              <a14:hiddenLine xmlns="" xmlns:a16="http://schemas.microsoft.com/office/drawing/2014/main" xmlns:p14="http://schemas.microsoft.com/office/powerpoint/2010/main" xmlns:dgm="http://schemas.openxmlformats.org/drawingml/2006/diagram" xmlns:a14="http://schemas.microsoft.com/office/drawing/2010/main" w="9525">
+              <a14:hiddenLine xmlns:a14="http://schemas.microsoft.com/office/drawing/2010/main" xmlns:dgm="http://schemas.openxmlformats.org/drawingml/2006/diagram" xmlns:p14="http://schemas.microsoft.com/office/powerpoint/2010/main" xmlns:a16="http://schemas.microsoft.com/office/drawing/2014/main" xmlns="" w="9525">
                 <a:solidFill>
                   <a:srgbClr val="000000"/>
                 </a:solidFill>
@@ -34232,7 +34232,7 @@
         <p:spPr>
           <a:xfrm>
             <a:off x="8544276" y="65447"/>
-            <a:ext cx="2643256" cy="6526563"/>
+            <a:ext cx="2421798" cy="5979753"/>
           </a:xfrm>
           <a:prstGeom prst="rect">
             <a:avLst/>
@@ -34255,7 +34255,7 @@
             <p:ph idx="1"/>
             <p:extLst>
               <p:ext uri="{D42A27DB-BD31-4B8C-83A1-F6EECF244321}">
-                <p14:modId xmlns:p14="http://schemas.microsoft.com/office/powerpoint/2010/main" val="3589004635"/>
+                <p14:modId xmlns:p14="http://schemas.microsoft.com/office/powerpoint/2010/main" val="2102503274"/>
               </p:ext>
             </p:extLst>
           </p:nvPr>
@@ -34270,6 +34270,45 @@
           </a:graphicData>
         </a:graphic>
       </p:graphicFrame>
+      <p:sp>
+        <p:nvSpPr>
+          <p:cNvPr id="3" name="CasetăText 2">
+            <a:extLst>
+              <a:ext uri="{FF2B5EF4-FFF2-40B4-BE49-F238E27FC236}">
+                <a16:creationId xmlns:a16="http://schemas.microsoft.com/office/drawing/2014/main" id="{4198BC2A-00A8-1172-C9D4-BEEA8FF3E39B}"/>
+              </a:ext>
+            </a:extLst>
+          </p:cNvPr>
+          <p:cNvSpPr txBox="1"/>
+          <p:nvPr/>
+        </p:nvSpPr>
+        <p:spPr>
+          <a:xfrm>
+            <a:off x="8368817" y="6128434"/>
+            <a:ext cx="3004260" cy="646331"/>
+          </a:xfrm>
+          <a:prstGeom prst="rect">
+            <a:avLst/>
+          </a:prstGeom>
+          <a:noFill/>
+        </p:spPr>
+        <p:txBody>
+          <a:bodyPr wrap="square" rtlCol="0">
+            <a:spAutoFit/>
+          </a:bodyPr>
+          <a:lstStyle/>
+          <a:p>
+            <a:pPr algn="ctr"/>
+            <a:r>
+              <a:rPr lang="en-US" dirty="0">
+                <a:latin typeface="Times New Roman" panose="02020603050405020304" pitchFamily="18" charset="0"/>
+                <a:cs typeface="Times New Roman" panose="02020603050405020304" pitchFamily="18" charset="0"/>
+              </a:rPr>
+              <a:t>Figure 3. User request path from UI to MAS. </a:t>
+            </a:r>
+          </a:p>
+        </p:txBody>
+      </p:sp>
     </p:spTree>
     <p:extLst>
       <p:ext uri="{BB962C8B-B14F-4D97-AF65-F5344CB8AC3E}">
@@ -34530,7 +34569,7 @@
                 <a:latin typeface="Times New Roman" panose="02020603050405020304" pitchFamily="18" charset="0"/>
                 <a:cs typeface="Times New Roman" panose="02020603050405020304" pitchFamily="18" charset="0"/>
               </a:rPr>
-              <a:t>Figure 2. Image taken from [2]</a:t>
+              <a:t>Figure 4. Image taken from [2]</a:t>
             </a:r>
             <a:endParaRPr lang="en-US" dirty="0"/>
           </a:p>
@@ -34569,7 +34608,7 @@
                 <a:latin typeface="Times New Roman" panose="02020603050405020304" pitchFamily="18" charset="0"/>
                 <a:cs typeface="Times New Roman" panose="02020603050405020304" pitchFamily="18" charset="0"/>
               </a:rPr>
-              <a:t>Figure 3. Image taken from [3]</a:t>
+              <a:t>Figure 5. Image taken from [3]</a:t>
             </a:r>
             <a:endParaRPr lang="en-US" dirty="0"/>
           </a:p>
@@ -34611,7 +34650,7 @@
                 <a:latin typeface="Times New Roman" panose="02020603050405020304" pitchFamily="18" charset="0"/>
                 <a:cs typeface="Times New Roman" panose="02020603050405020304" pitchFamily="18" charset="0"/>
               </a:rPr>
-              <a:t>Figure 4. Image taken from [4]</a:t>
+              <a:t>Figure 6. Image taken from [4]</a:t>
             </a:r>
             <a:endParaRPr lang="en-US" dirty="0"/>
           </a:p>
@@ -34653,7 +34692,7 @@
                 <a:latin typeface="Times New Roman" panose="02020603050405020304" pitchFamily="18" charset="0"/>
                 <a:cs typeface="Times New Roman" panose="02020603050405020304" pitchFamily="18" charset="0"/>
               </a:rPr>
-              <a:t>Figure 5. Image taken from [5]</a:t>
+              <a:t>Figure 7. Image taken from [5]</a:t>
             </a:r>
             <a:endParaRPr lang="en-US" dirty="0"/>
           </a:p>
@@ -34702,7 +34741,7 @@
       </p:grpSpPr>
       <p:sp>
         <p:nvSpPr>
-          <p:cNvPr id="7" name="Freeform 6">
+          <p:cNvPr id="25" name="Freeform 6">
             <a:extLst>
               <a:ext uri="{FF2B5EF4-FFF2-40B4-BE49-F238E27FC236}">
                 <a16:creationId xmlns:a16="http://schemas.microsoft.com/office/drawing/2014/main" id="{133F8CB7-795C-4272-9073-64D8CF97F220}"/>
@@ -34823,7 +34862,7 @@
       </p:sp>
       <p:sp>
         <p:nvSpPr>
-          <p:cNvPr id="8" name="Rectangle 11">
+          <p:cNvPr id="27" name="Rectangle 26">
             <a:extLst>
               <a:ext uri="{FF2B5EF4-FFF2-40B4-BE49-F238E27FC236}">
                 <a16:creationId xmlns:a16="http://schemas.microsoft.com/office/drawing/2014/main" id="{B7743172-17A8-4FA4-8434-B813E03B7665}"/>
@@ -34886,7 +34925,7 @@
       </p:sp>
       <p:sp>
         <p:nvSpPr>
-          <p:cNvPr id="11" name="Freeform 23">
+          <p:cNvPr id="29" name="Freeform 23">
             <a:extLst>
               <a:ext uri="{FF2B5EF4-FFF2-40B4-BE49-F238E27FC236}">
                 <a16:creationId xmlns:a16="http://schemas.microsoft.com/office/drawing/2014/main" id="{4CE1233C-FD2F-489E-BFDE-086F5FED6491}"/>
@@ -35109,8 +35148,8 @@
         </p:nvSpPr>
         <p:spPr>
           <a:xfrm>
-            <a:off x="496070" y="1308432"/>
-            <a:ext cx="3644864" cy="4241136"/>
+            <a:off x="451514" y="1800225"/>
+            <a:ext cx="3444211" cy="4241136"/>
           </a:xfrm>
         </p:spPr>
         <p:txBody>
@@ -35120,7 +35159,7 @@
           <a:lstStyle/>
           <a:p>
             <a:r>
-              <a:rPr lang="en-US" sz="4400" dirty="0">
+              <a:rPr lang="en-US" sz="3700" dirty="0">
                 <a:latin typeface="Times New Roman" panose="02020603050405020304" pitchFamily="18" charset="0"/>
                 <a:cs typeface="Times New Roman" panose="02020603050405020304" pitchFamily="18" charset="0"/>
               </a:rPr>
@@ -35131,10 +35170,10 @@
       </p:sp>
       <p:pic>
         <p:nvPicPr>
-          <p:cNvPr id="5" name="Substituent conținut 4">
+          <p:cNvPr id="9" name="Substituent conținut 8">
             <a:extLst>
               <a:ext uri="{FF2B5EF4-FFF2-40B4-BE49-F238E27FC236}">
-                <a16:creationId xmlns:a16="http://schemas.microsoft.com/office/drawing/2014/main" id="{971BF642-FECD-E47E-C121-45B9DEF96CA2}"/>
+                <a16:creationId xmlns:a16="http://schemas.microsoft.com/office/drawing/2014/main" id="{B0AEB2D0-40C3-56A5-E87F-5E052FF3352E}"/>
               </a:ext>
             </a:extLst>
           </p:cNvPr>
@@ -35159,8 +35198,8 @@
         </p:blipFill>
         <p:spPr>
           <a:xfrm>
-            <a:off x="5310163" y="38908"/>
-            <a:ext cx="6430323" cy="6750996"/>
+            <a:off x="4767196" y="27887"/>
+            <a:ext cx="7294612" cy="6802226"/>
           </a:xfrm>
           <a:prstGeom prst="roundRect">
             <a:avLst>

</xml_diff>